<commit_message>
1. Created db.properties file 2. removed hardcoding from jdbcConnection.class
</commit_message>
<xml_diff>
--- a/resources/Krishna_Projects.pptx
+++ b/resources/Krishna_Projects.pptx
@@ -200,7 +200,7 @@
           <a:p>
             <a:fld id="{88EC5953-7543-4F6C-8289-3FC487ED4645}" type="datetimeFigureOut">
               <a:rPr lang="en-US" smtClean="0"/>
-              <a:t>8/12/2018</a:t>
+              <a:t>9/12/2018</a:t>
             </a:fld>
             <a:endParaRPr lang="en-US"/>
           </a:p>
@@ -733,7 +733,7 @@
           <a:p>
             <a:fld id="{7C24B7C4-E531-4571-B1AE-508F84C0C54A}" type="datetimeFigureOut">
               <a:rPr lang="en-US" smtClean="0"/>
-              <a:t>8/12/2018</a:t>
+              <a:t>9/12/2018</a:t>
             </a:fld>
             <a:endParaRPr lang="en-US"/>
           </a:p>
@@ -903,7 +903,7 @@
           <a:p>
             <a:fld id="{7C24B7C4-E531-4571-B1AE-508F84C0C54A}" type="datetimeFigureOut">
               <a:rPr lang="en-US" smtClean="0"/>
-              <a:t>8/12/2018</a:t>
+              <a:t>9/12/2018</a:t>
             </a:fld>
             <a:endParaRPr lang="en-US"/>
           </a:p>
@@ -1083,7 +1083,7 @@
           <a:p>
             <a:fld id="{7C24B7C4-E531-4571-B1AE-508F84C0C54A}" type="datetimeFigureOut">
               <a:rPr lang="en-US" smtClean="0"/>
-              <a:t>8/12/2018</a:t>
+              <a:t>9/12/2018</a:t>
             </a:fld>
             <a:endParaRPr lang="en-US"/>
           </a:p>
@@ -1253,7 +1253,7 @@
           <a:p>
             <a:fld id="{7C24B7C4-E531-4571-B1AE-508F84C0C54A}" type="datetimeFigureOut">
               <a:rPr lang="en-US" smtClean="0"/>
-              <a:t>8/12/2018</a:t>
+              <a:t>9/12/2018</a:t>
             </a:fld>
             <a:endParaRPr lang="en-US"/>
           </a:p>
@@ -1499,7 +1499,7 @@
           <a:p>
             <a:fld id="{7C24B7C4-E531-4571-B1AE-508F84C0C54A}" type="datetimeFigureOut">
               <a:rPr lang="en-US" smtClean="0"/>
-              <a:t>8/12/2018</a:t>
+              <a:t>9/12/2018</a:t>
             </a:fld>
             <a:endParaRPr lang="en-US"/>
           </a:p>
@@ -1787,7 +1787,7 @@
           <a:p>
             <a:fld id="{7C24B7C4-E531-4571-B1AE-508F84C0C54A}" type="datetimeFigureOut">
               <a:rPr lang="en-US" smtClean="0"/>
-              <a:t>8/12/2018</a:t>
+              <a:t>9/12/2018</a:t>
             </a:fld>
             <a:endParaRPr lang="en-US"/>
           </a:p>
@@ -2209,7 +2209,7 @@
           <a:p>
             <a:fld id="{7C24B7C4-E531-4571-B1AE-508F84C0C54A}" type="datetimeFigureOut">
               <a:rPr lang="en-US" smtClean="0"/>
-              <a:t>8/12/2018</a:t>
+              <a:t>9/12/2018</a:t>
             </a:fld>
             <a:endParaRPr lang="en-US"/>
           </a:p>
@@ -2327,7 +2327,7 @@
           <a:p>
             <a:fld id="{7C24B7C4-E531-4571-B1AE-508F84C0C54A}" type="datetimeFigureOut">
               <a:rPr lang="en-US" smtClean="0"/>
-              <a:t>8/12/2018</a:t>
+              <a:t>9/12/2018</a:t>
             </a:fld>
             <a:endParaRPr lang="en-US"/>
           </a:p>
@@ -2422,7 +2422,7 @@
           <a:p>
             <a:fld id="{7C24B7C4-E531-4571-B1AE-508F84C0C54A}" type="datetimeFigureOut">
               <a:rPr lang="en-US" smtClean="0"/>
-              <a:t>8/12/2018</a:t>
+              <a:t>9/12/2018</a:t>
             </a:fld>
             <a:endParaRPr lang="en-US"/>
           </a:p>
@@ -2699,7 +2699,7 @@
           <a:p>
             <a:fld id="{7C24B7C4-E531-4571-B1AE-508F84C0C54A}" type="datetimeFigureOut">
               <a:rPr lang="en-US" smtClean="0"/>
-              <a:t>8/12/2018</a:t>
+              <a:t>9/12/2018</a:t>
             </a:fld>
             <a:endParaRPr lang="en-US"/>
           </a:p>
@@ -2952,7 +2952,7 @@
           <a:p>
             <a:fld id="{7C24B7C4-E531-4571-B1AE-508F84C0C54A}" type="datetimeFigureOut">
               <a:rPr lang="en-US" smtClean="0"/>
-              <a:t>8/12/2018</a:t>
+              <a:t>9/12/2018</a:t>
             </a:fld>
             <a:endParaRPr lang="en-US"/>
           </a:p>
@@ -3165,7 +3165,7 @@
           <a:p>
             <a:fld id="{7C24B7C4-E531-4571-B1AE-508F84C0C54A}" type="datetimeFigureOut">
               <a:rPr lang="en-US" smtClean="0"/>
-              <a:t>8/12/2018</a:t>
+              <a:t>9/12/2018</a:t>
             </a:fld>
             <a:endParaRPr lang="en-US"/>
           </a:p>
@@ -4435,7 +4435,15 @@
             <a:pPr algn="ctr"/>
             <a:r>
               <a:rPr lang="en-US" dirty="0" smtClean="0"/>
-              <a:t>SAVE BUTTON</a:t>
+              <a:t>LOGIN</a:t>
+            </a:r>
+            <a:r>
+              <a:rPr lang="en-US" dirty="0" smtClean="0"/>
+              <a:t> </a:t>
+            </a:r>
+            <a:r>
+              <a:rPr lang="en-US" dirty="0" smtClean="0"/>
+              <a:t>BUTTON</a:t>
             </a:r>
             <a:endParaRPr lang="en-US" dirty="0"/>
           </a:p>
@@ -5801,7 +5809,7 @@
           <a:graphicData uri="http://schemas.openxmlformats.org/presentationml/2006/ole">
             <mc:AlternateContent xmlns:mc="http://schemas.openxmlformats.org/markup-compatibility/2006">
               <mc:Choice xmlns:v="urn:schemas-microsoft-com:vml" Requires="v">
-                <p:oleObj spid="_x0000_s1066" name="Packager Shell Object" showAsIcon="1" r:id="rId4" imgW="1879560" imgH="686880" progId="Package">
+                <p:oleObj spid="_x0000_s1074" name="Packager Shell Object" showAsIcon="1" r:id="rId4" imgW="1879560" imgH="686880" progId="Package">
                   <p:embed/>
                 </p:oleObj>
               </mc:Choice>
@@ -5845,7 +5853,7 @@
           <p:nvPr>
             <p:extLst>
               <p:ext uri="{D42A27DB-BD31-4B8C-83A1-F6EECF244321}">
-                <p14:modId xmlns:p14="http://schemas.microsoft.com/office/powerpoint/2010/main" val="2271875928"/>
+                <p14:modId xmlns:p14="http://schemas.microsoft.com/office/powerpoint/2010/main" val="1392469820"/>
               </p:ext>
             </p:extLst>
           </p:nvPr>
@@ -5858,7 +5866,7 @@
           <a:graphicData uri="http://schemas.openxmlformats.org/presentationml/2006/ole">
             <mc:AlternateContent xmlns:mc="http://schemas.openxmlformats.org/markup-compatibility/2006">
               <mc:Choice xmlns:v="urn:schemas-microsoft-com:vml" Requires="v">
-                <p:oleObj spid="_x0000_s1067" name="Packager Shell Object" showAsIcon="1" r:id="rId6" imgW="3124080" imgH="686880" progId="Package">
+                <p:oleObj spid="_x0000_s1075" name="Packager Shell Object" showAsIcon="1" r:id="rId6" imgW="3124080" imgH="686880" progId="Package">
                   <p:embed/>
                 </p:oleObj>
               </mc:Choice>
@@ -5915,7 +5923,7 @@
           <a:graphicData uri="http://schemas.openxmlformats.org/presentationml/2006/ole">
             <mc:AlternateContent xmlns:mc="http://schemas.openxmlformats.org/markup-compatibility/2006">
               <mc:Choice xmlns:v="urn:schemas-microsoft-com:vml" Requires="v">
-                <p:oleObj spid="_x0000_s1068" name="Packager Shell Object" showAsIcon="1" r:id="rId8" imgW="2425680" imgH="686880" progId="Package">
+                <p:oleObj spid="_x0000_s1076" name="Packager Shell Object" showAsIcon="1" r:id="rId8" imgW="2425680" imgH="686880" progId="Package">
                   <p:embed/>
                 </p:oleObj>
               </mc:Choice>
@@ -5972,7 +5980,7 @@
           <a:graphicData uri="http://schemas.openxmlformats.org/presentationml/2006/ole">
             <mc:AlternateContent xmlns:mc="http://schemas.openxmlformats.org/markup-compatibility/2006">
               <mc:Choice xmlns:v="urn:schemas-microsoft-com:vml" Requires="v">
-                <p:oleObj spid="_x0000_s1069" name="Packager Shell Object" showAsIcon="1" r:id="rId10" imgW="3174840" imgH="686880" progId="Package">
+                <p:oleObj spid="_x0000_s1077" name="Packager Shell Object" showAsIcon="1" r:id="rId10" imgW="3174840" imgH="686880" progId="Package">
                   <p:embed/>
                 </p:oleObj>
               </mc:Choice>

</xml_diff>

<commit_message>
1. Added StateMasterRepository and StateMasterService 2. Renamed YearRepository -> YearMasterRepository 3. Modified PPT. 4. Modified YearMasterService
</commit_message>
<xml_diff>
--- a/resources/Krishna_Projects.pptx
+++ b/resources/Krishna_Projects.pptx
@@ -5,7 +5,7 @@
     <p:sldMasterId id="2147483648" r:id="rId1"/>
   </p:sldMasterIdLst>
   <p:notesMasterIdLst>
-    <p:notesMasterId r:id="rId11"/>
+    <p:notesMasterId r:id="rId12"/>
   </p:notesMasterIdLst>
   <p:sldIdLst>
     <p:sldId id="256" r:id="rId2"/>
@@ -17,6 +17,7 @@
     <p:sldId id="263" r:id="rId8"/>
     <p:sldId id="264" r:id="rId9"/>
     <p:sldId id="258" r:id="rId10"/>
+    <p:sldId id="265" r:id="rId11"/>
   </p:sldIdLst>
   <p:sldSz cx="9144000" cy="6858000" type="screen4x3"/>
   <p:notesSz cx="6858000" cy="9144000"/>
@@ -200,7 +201,7 @@
           <a:p>
             <a:fld id="{88EC5953-7543-4F6C-8289-3FC487ED4645}" type="datetimeFigureOut">
               <a:rPr lang="en-US" smtClean="0"/>
-              <a:t>9/12/2018</a:t>
+              <a:t>10/21/2018</a:t>
             </a:fld>
             <a:endParaRPr lang="en-US"/>
           </a:p>
@@ -733,7 +734,7 @@
           <a:p>
             <a:fld id="{7C24B7C4-E531-4571-B1AE-508F84C0C54A}" type="datetimeFigureOut">
               <a:rPr lang="en-US" smtClean="0"/>
-              <a:t>9/12/2018</a:t>
+              <a:t>10/21/2018</a:t>
             </a:fld>
             <a:endParaRPr lang="en-US"/>
           </a:p>
@@ -903,7 +904,7 @@
           <a:p>
             <a:fld id="{7C24B7C4-E531-4571-B1AE-508F84C0C54A}" type="datetimeFigureOut">
               <a:rPr lang="en-US" smtClean="0"/>
-              <a:t>9/12/2018</a:t>
+              <a:t>10/21/2018</a:t>
             </a:fld>
             <a:endParaRPr lang="en-US"/>
           </a:p>
@@ -1083,7 +1084,7 @@
           <a:p>
             <a:fld id="{7C24B7C4-E531-4571-B1AE-508F84C0C54A}" type="datetimeFigureOut">
               <a:rPr lang="en-US" smtClean="0"/>
-              <a:t>9/12/2018</a:t>
+              <a:t>10/21/2018</a:t>
             </a:fld>
             <a:endParaRPr lang="en-US"/>
           </a:p>
@@ -1253,7 +1254,7 @@
           <a:p>
             <a:fld id="{7C24B7C4-E531-4571-B1AE-508F84C0C54A}" type="datetimeFigureOut">
               <a:rPr lang="en-US" smtClean="0"/>
-              <a:t>9/12/2018</a:t>
+              <a:t>10/21/2018</a:t>
             </a:fld>
             <a:endParaRPr lang="en-US"/>
           </a:p>
@@ -1499,7 +1500,7 @@
           <a:p>
             <a:fld id="{7C24B7C4-E531-4571-B1AE-508F84C0C54A}" type="datetimeFigureOut">
               <a:rPr lang="en-US" smtClean="0"/>
-              <a:t>9/12/2018</a:t>
+              <a:t>10/21/2018</a:t>
             </a:fld>
             <a:endParaRPr lang="en-US"/>
           </a:p>
@@ -1787,7 +1788,7 @@
           <a:p>
             <a:fld id="{7C24B7C4-E531-4571-B1AE-508F84C0C54A}" type="datetimeFigureOut">
               <a:rPr lang="en-US" smtClean="0"/>
-              <a:t>9/12/2018</a:t>
+              <a:t>10/21/2018</a:t>
             </a:fld>
             <a:endParaRPr lang="en-US"/>
           </a:p>
@@ -2209,7 +2210,7 @@
           <a:p>
             <a:fld id="{7C24B7C4-E531-4571-B1AE-508F84C0C54A}" type="datetimeFigureOut">
               <a:rPr lang="en-US" smtClean="0"/>
-              <a:t>9/12/2018</a:t>
+              <a:t>10/21/2018</a:t>
             </a:fld>
             <a:endParaRPr lang="en-US"/>
           </a:p>
@@ -2327,7 +2328,7 @@
           <a:p>
             <a:fld id="{7C24B7C4-E531-4571-B1AE-508F84C0C54A}" type="datetimeFigureOut">
               <a:rPr lang="en-US" smtClean="0"/>
-              <a:t>9/12/2018</a:t>
+              <a:t>10/21/2018</a:t>
             </a:fld>
             <a:endParaRPr lang="en-US"/>
           </a:p>
@@ -2422,7 +2423,7 @@
           <a:p>
             <a:fld id="{7C24B7C4-E531-4571-B1AE-508F84C0C54A}" type="datetimeFigureOut">
               <a:rPr lang="en-US" smtClean="0"/>
-              <a:t>9/12/2018</a:t>
+              <a:t>10/21/2018</a:t>
             </a:fld>
             <a:endParaRPr lang="en-US"/>
           </a:p>
@@ -2699,7 +2700,7 @@
           <a:p>
             <a:fld id="{7C24B7C4-E531-4571-B1AE-508F84C0C54A}" type="datetimeFigureOut">
               <a:rPr lang="en-US" smtClean="0"/>
-              <a:t>9/12/2018</a:t>
+              <a:t>10/21/2018</a:t>
             </a:fld>
             <a:endParaRPr lang="en-US"/>
           </a:p>
@@ -2952,7 +2953,7 @@
           <a:p>
             <a:fld id="{7C24B7C4-E531-4571-B1AE-508F84C0C54A}" type="datetimeFigureOut">
               <a:rPr lang="en-US" smtClean="0"/>
-              <a:t>9/12/2018</a:t>
+              <a:t>10/21/2018</a:t>
             </a:fld>
             <a:endParaRPr lang="en-US"/>
           </a:p>
@@ -3165,7 +3166,7 @@
           <a:p>
             <a:fld id="{7C24B7C4-E531-4571-B1AE-508F84C0C54A}" type="datetimeFigureOut">
               <a:rPr lang="en-US" smtClean="0"/>
-              <a:t>9/12/2018</a:t>
+              <a:t>10/21/2018</a:t>
             </a:fld>
             <a:endParaRPr lang="en-US"/>
           </a:p>
@@ -3859,6 +3860,137 @@
 </p:sld>
 </file>
 
+<file path=ppt/slides/slide10.xml><?xml version="1.0" encoding="utf-8"?>
+<p:sld xmlns:a="http://schemas.openxmlformats.org/drawingml/2006/main" xmlns:r="http://schemas.openxmlformats.org/officeDocument/2006/relationships" xmlns:p="http://schemas.openxmlformats.org/presentationml/2006/main">
+  <p:cSld>
+    <p:spTree>
+      <p:nvGrpSpPr>
+        <p:cNvPr id="1" name=""/>
+        <p:cNvGrpSpPr/>
+        <p:nvPr/>
+      </p:nvGrpSpPr>
+      <p:grpSpPr>
+        <a:xfrm>
+          <a:off x="0" y="0"/>
+          <a:ext cx="0" cy="0"/>
+          <a:chOff x="0" y="0"/>
+          <a:chExt cx="0" cy="0"/>
+        </a:xfrm>
+      </p:grpSpPr>
+      <p:sp>
+        <p:nvSpPr>
+          <p:cNvPr id="2" name="TextBox 1"/>
+          <p:cNvSpPr txBox="1"/>
+          <p:nvPr/>
+        </p:nvSpPr>
+        <p:spPr>
+          <a:xfrm>
+            <a:off x="1143000" y="762000"/>
+            <a:ext cx="6172200" cy="369332"/>
+          </a:xfrm>
+          <a:prstGeom prst="rect">
+            <a:avLst/>
+          </a:prstGeom>
+          <a:noFill/>
+        </p:spPr>
+        <p:txBody>
+          <a:bodyPr wrap="square" rtlCol="0">
+            <a:spAutoFit/>
+          </a:bodyPr>
+          <a:lstStyle/>
+          <a:p>
+            <a:r>
+              <a:rPr lang="en-US" dirty="0" smtClean="0"/>
+              <a:t>To be done:</a:t>
+            </a:r>
+            <a:endParaRPr lang="en-US" dirty="0"/>
+          </a:p>
+        </p:txBody>
+      </p:sp>
+      <p:sp>
+        <p:nvSpPr>
+          <p:cNvPr id="3" name="TextBox 2"/>
+          <p:cNvSpPr txBox="1"/>
+          <p:nvPr/>
+        </p:nvSpPr>
+        <p:spPr>
+          <a:xfrm>
+            <a:off x="1143000" y="1752600"/>
+            <a:ext cx="6324600" cy="1200329"/>
+          </a:xfrm>
+          <a:prstGeom prst="rect">
+            <a:avLst/>
+          </a:prstGeom>
+          <a:noFill/>
+        </p:spPr>
+        <p:txBody>
+          <a:bodyPr wrap="square" rtlCol="0">
+            <a:spAutoFit/>
+          </a:bodyPr>
+          <a:lstStyle/>
+          <a:p>
+            <a:pPr marL="342900" indent="-342900">
+              <a:buAutoNum type="arabicPeriod"/>
+            </a:pPr>
+            <a:r>
+              <a:rPr lang="en-US" dirty="0" smtClean="0"/>
+              <a:t>Remove Job Order Number from </a:t>
+            </a:r>
+            <a:r>
+              <a:rPr lang="en-US" dirty="0" err="1" smtClean="0"/>
+              <a:t>JobMaster</a:t>
+            </a:r>
+            <a:r>
+              <a:rPr lang="en-US" dirty="0" smtClean="0"/>
+              <a:t> add and update</a:t>
+            </a:r>
+          </a:p>
+          <a:p>
+            <a:pPr marL="342900" indent="-342900">
+              <a:buAutoNum type="arabicPeriod"/>
+            </a:pPr>
+            <a:r>
+              <a:rPr lang="en-US" dirty="0" smtClean="0"/>
+              <a:t>Persist Credit Days and Place of Service into the database.</a:t>
+            </a:r>
+          </a:p>
+          <a:p>
+            <a:pPr marL="342900" indent="-342900">
+              <a:buAutoNum type="arabicPeriod"/>
+            </a:pPr>
+            <a:r>
+              <a:rPr lang="en-US" dirty="0" smtClean="0"/>
+              <a:t>Show dropdown of </a:t>
+            </a:r>
+            <a:r>
+              <a:rPr lang="en-US" dirty="0" err="1" smtClean="0"/>
+              <a:t>State_Master</a:t>
+            </a:r>
+            <a:r>
+              <a:rPr lang="en-US" dirty="0" smtClean="0"/>
+              <a:t> table </a:t>
+            </a:r>
+            <a:r>
+              <a:rPr lang="en-US" smtClean="0"/>
+              <a:t>for “Place of Service” field</a:t>
+            </a:r>
+            <a:endParaRPr lang="en-US" dirty="0"/>
+          </a:p>
+        </p:txBody>
+      </p:sp>
+    </p:spTree>
+    <p:extLst>
+      <p:ext uri="{BB962C8B-B14F-4D97-AF65-F5344CB8AC3E}">
+        <p14:creationId xmlns:p14="http://schemas.microsoft.com/office/powerpoint/2010/main" val="1796304184"/>
+      </p:ext>
+    </p:extLst>
+  </p:cSld>
+  <p:clrMapOvr>
+    <a:masterClrMapping/>
+  </p:clrMapOvr>
+</p:sld>
+</file>
+
 <file path=ppt/slides/slide2.xml><?xml version="1.0" encoding="utf-8"?>
 <p:sld xmlns:a="http://schemas.openxmlformats.org/drawingml/2006/main" xmlns:r="http://schemas.openxmlformats.org/officeDocument/2006/relationships" xmlns:p="http://schemas.openxmlformats.org/presentationml/2006/main">
   <p:cSld>
@@ -4435,15 +4567,7 @@
             <a:pPr algn="ctr"/>
             <a:r>
               <a:rPr lang="en-US" dirty="0" smtClean="0"/>
-              <a:t>LOGIN</a:t>
-            </a:r>
-            <a:r>
-              <a:rPr lang="en-US" dirty="0" smtClean="0"/>
-              <a:t> </a:t>
-            </a:r>
-            <a:r>
-              <a:rPr lang="en-US" dirty="0" smtClean="0"/>
-              <a:t>BUTTON</a:t>
+              <a:t>LOGIN BUTTON</a:t>
             </a:r>
             <a:endParaRPr lang="en-US" dirty="0"/>
           </a:p>
@@ -5809,7 +5933,7 @@
           <a:graphicData uri="http://schemas.openxmlformats.org/presentationml/2006/ole">
             <mc:AlternateContent xmlns:mc="http://schemas.openxmlformats.org/markup-compatibility/2006">
               <mc:Choice xmlns:v="urn:schemas-microsoft-com:vml" Requires="v">
-                <p:oleObj spid="_x0000_s1074" name="Packager Shell Object" showAsIcon="1" r:id="rId4" imgW="1879560" imgH="686880" progId="Package">
+                <p:oleObj spid="_x0000_s1078" name="Packager Shell Object" showAsIcon="1" r:id="rId4" imgW="1879560" imgH="686880" progId="Package">
                   <p:embed/>
                 </p:oleObj>
               </mc:Choice>
@@ -5866,7 +5990,7 @@
           <a:graphicData uri="http://schemas.openxmlformats.org/presentationml/2006/ole">
             <mc:AlternateContent xmlns:mc="http://schemas.openxmlformats.org/markup-compatibility/2006">
               <mc:Choice xmlns:v="urn:schemas-microsoft-com:vml" Requires="v">
-                <p:oleObj spid="_x0000_s1075" name="Packager Shell Object" showAsIcon="1" r:id="rId6" imgW="3124080" imgH="686880" progId="Package">
+                <p:oleObj spid="_x0000_s1079" name="Packager Shell Object" showAsIcon="1" r:id="rId6" imgW="3124080" imgH="686880" progId="Package">
                   <p:embed/>
                 </p:oleObj>
               </mc:Choice>
@@ -5923,7 +6047,7 @@
           <a:graphicData uri="http://schemas.openxmlformats.org/presentationml/2006/ole">
             <mc:AlternateContent xmlns:mc="http://schemas.openxmlformats.org/markup-compatibility/2006">
               <mc:Choice xmlns:v="urn:schemas-microsoft-com:vml" Requires="v">
-                <p:oleObj spid="_x0000_s1076" name="Packager Shell Object" showAsIcon="1" r:id="rId8" imgW="2425680" imgH="686880" progId="Package">
+                <p:oleObj spid="_x0000_s1080" name="Packager Shell Object" showAsIcon="1" r:id="rId8" imgW="2425680" imgH="686880" progId="Package">
                   <p:embed/>
                 </p:oleObj>
               </mc:Choice>
@@ -5980,7 +6104,7 @@
           <a:graphicData uri="http://schemas.openxmlformats.org/presentationml/2006/ole">
             <mc:AlternateContent xmlns:mc="http://schemas.openxmlformats.org/markup-compatibility/2006">
               <mc:Choice xmlns:v="urn:schemas-microsoft-com:vml" Requires="v">
-                <p:oleObj spid="_x0000_s1077" name="Packager Shell Object" showAsIcon="1" r:id="rId10" imgW="3174840" imgH="686880" progId="Package">
+                <p:oleObj spid="_x0000_s1081" name="Packager Shell Object" showAsIcon="1" r:id="rId10" imgW="3174840" imgH="686880" progId="Package">
                   <p:embed/>
                 </p:oleObj>
               </mc:Choice>

</xml_diff>